<commit_message>
update Unit 9 ppt
</commit_message>
<xml_diff>
--- a/Unit 9 Case Study_Nelson_Hedge.pptx
+++ b/Unit 9 Case Study_Nelson_Hedge.pptx
@@ -2357,7 +2357,7 @@
 </file>
 
 <file path=ppt/slides/slide10.xml><?xml version="1.0" encoding="utf-8"?>
-<p:sld xmlns:a="http://schemas.openxmlformats.org/drawingml/2006/main" xmlns:r="http://schemas.openxmlformats.org/officeDocument/2006/relationships" xmlns:p="http://schemas.openxmlformats.org/presentationml/2006/main" show="0">
+<p:sld xmlns:a="http://schemas.openxmlformats.org/drawingml/2006/main" xmlns:r="http://schemas.openxmlformats.org/officeDocument/2006/relationships" xmlns:p="http://schemas.openxmlformats.org/presentationml/2006/main">
   <p:cSld>
     <p:spTree>
       <p:nvGrpSpPr>
@@ -2491,8 +2491,12 @@
             <a:p>
               <a:pPr algn="ctr"/>
               <a:r>
+                <a:rPr lang="en-US" sz="1400" b="1" dirty="0" err="1"/>
+                <a:t>kNN</a:t>
+              </a:r>
+              <a:r>
                 <a:rPr lang="en-US" sz="1400" b="1" dirty="0"/>
-                <a:t>Filled data has correlation of 54% which is due to large cluster of filled data below 50 ABV</a:t>
+                <a:t> filled data has correlation of 54% which is due to large clustering of filled data below 50 IBU</a:t>
               </a:r>
             </a:p>
           </p:txBody>
@@ -2544,6 +2548,80 @@
           </p:txBody>
         </p:sp>
       </p:grpSp>
+      <p:sp>
+        <p:nvSpPr>
+          <p:cNvPr id="8" name="TextBox 7">
+            <a:extLst>
+              <a:ext uri="{FF2B5EF4-FFF2-40B4-BE49-F238E27FC236}">
+                <a16:creationId xmlns:a16="http://schemas.microsoft.com/office/drawing/2014/main" id="{2055C107-A0A4-452D-BA6D-EA974F2F87B4}"/>
+              </a:ext>
+            </a:extLst>
+          </p:cNvPr>
+          <p:cNvSpPr txBox="1"/>
+          <p:nvPr/>
+        </p:nvSpPr>
+        <p:spPr>
+          <a:xfrm>
+            <a:off x="370704" y="3682311"/>
+            <a:ext cx="827902" cy="461665"/>
+          </a:xfrm>
+          <a:prstGeom prst="rect">
+            <a:avLst/>
+          </a:prstGeom>
+          <a:solidFill>
+            <a:schemeClr val="bg1"/>
+          </a:solidFill>
+        </p:spPr>
+        <p:txBody>
+          <a:bodyPr wrap="square" rtlCol="0">
+            <a:spAutoFit/>
+          </a:bodyPr>
+          <a:lstStyle/>
+          <a:p>
+            <a:r>
+              <a:rPr lang="en-US" sz="2400" dirty="0"/>
+              <a:t>ABV</a:t>
+            </a:r>
+          </a:p>
+        </p:txBody>
+      </p:sp>
+      <p:sp>
+        <p:nvSpPr>
+          <p:cNvPr id="11" name="TextBox 10">
+            <a:extLst>
+              <a:ext uri="{FF2B5EF4-FFF2-40B4-BE49-F238E27FC236}">
+                <a16:creationId xmlns:a16="http://schemas.microsoft.com/office/drawing/2014/main" id="{40124F50-40D8-4E30-A958-E05141AF4791}"/>
+              </a:ext>
+            </a:extLst>
+          </p:cNvPr>
+          <p:cNvSpPr txBox="1"/>
+          <p:nvPr/>
+        </p:nvSpPr>
+        <p:spPr>
+          <a:xfrm>
+            <a:off x="4572000" y="6167735"/>
+            <a:ext cx="827902" cy="461665"/>
+          </a:xfrm>
+          <a:prstGeom prst="rect">
+            <a:avLst/>
+          </a:prstGeom>
+          <a:solidFill>
+            <a:schemeClr val="bg1"/>
+          </a:solidFill>
+        </p:spPr>
+        <p:txBody>
+          <a:bodyPr wrap="square" rtlCol="0">
+            <a:spAutoFit/>
+          </a:bodyPr>
+          <a:lstStyle/>
+          <a:p>
+            <a:r>
+              <a:rPr lang="en-US" sz="2400" dirty="0"/>
+              <a:t>IBU</a:t>
+            </a:r>
+          </a:p>
+        </p:txBody>
+      </p:sp>
     </p:spTree>
     <p:extLst>
       <p:ext uri="{BB962C8B-B14F-4D97-AF65-F5344CB8AC3E}">
@@ -2758,13 +2836,8 @@
             </a:pPr>
             <a:r>
               <a:rPr lang="en-US" dirty="0"/>
-              <a:t>More complete data set for </a:t>
-            </a:r>
-            <a:r>
-              <a:rPr lang="en-US"/>
-              <a:t>better analysis.</a:t>
-            </a:r>
-            <a:endParaRPr lang="en-US" dirty="0"/>
+              <a:t>More complete data set for better analysis.</a:t>
+            </a:r>
           </a:p>
         </p:txBody>
       </p:sp>
@@ -2778,6 +2851,158 @@
   <p:clrMapOvr>
     <a:masterClrMapping/>
   </p:clrMapOvr>
+  <p:timing>
+    <p:tnLst>
+      <p:par>
+        <p:cTn id="1" dur="indefinite" restart="never" nodeType="tmRoot">
+          <p:childTnLst>
+            <p:seq concurrent="1" nextAc="seek">
+              <p:cTn id="2" dur="indefinite" nodeType="mainSeq">
+                <p:childTnLst>
+                  <p:par>
+                    <p:cTn id="3" fill="hold">
+                      <p:stCondLst>
+                        <p:cond delay="indefinite"/>
+                      </p:stCondLst>
+                      <p:childTnLst>
+                        <p:par>
+                          <p:cTn id="4" fill="hold">
+                            <p:stCondLst>
+                              <p:cond delay="0"/>
+                            </p:stCondLst>
+                            <p:childTnLst>
+                              <p:par>
+                                <p:cTn id="5" presetID="10" presetClass="entr" presetSubtype="0" fill="hold" nodeType="clickEffect">
+                                  <p:stCondLst>
+                                    <p:cond delay="0"/>
+                                  </p:stCondLst>
+                                  <p:childTnLst>
+                                    <p:set>
+                                      <p:cBhvr>
+                                        <p:cTn id="6" dur="1" fill="hold">
+                                          <p:stCondLst>
+                                            <p:cond delay="0"/>
+                                          </p:stCondLst>
+                                        </p:cTn>
+                                        <p:tgtEl>
+                                          <p:spTgt spid="3">
+                                            <p:txEl>
+                                              <p:pRg st="0" end="0"/>
+                                            </p:txEl>
+                                          </p:spTgt>
+                                        </p:tgtEl>
+                                        <p:attrNameLst>
+                                          <p:attrName>style.visibility</p:attrName>
+                                        </p:attrNameLst>
+                                      </p:cBhvr>
+                                      <p:to>
+                                        <p:strVal val="visible"/>
+                                      </p:to>
+                                    </p:set>
+                                    <p:animEffect transition="in" filter="fade">
+                                      <p:cBhvr>
+                                        <p:cTn id="7" dur="500"/>
+                                        <p:tgtEl>
+                                          <p:spTgt spid="3">
+                                            <p:txEl>
+                                              <p:pRg st="0" end="0"/>
+                                            </p:txEl>
+                                          </p:spTgt>
+                                        </p:tgtEl>
+                                      </p:cBhvr>
+                                    </p:animEffect>
+                                  </p:childTnLst>
+                                </p:cTn>
+                              </p:par>
+                            </p:childTnLst>
+                          </p:cTn>
+                        </p:par>
+                      </p:childTnLst>
+                    </p:cTn>
+                  </p:par>
+                  <p:par>
+                    <p:cTn id="8" fill="hold">
+                      <p:stCondLst>
+                        <p:cond delay="indefinite"/>
+                      </p:stCondLst>
+                      <p:childTnLst>
+                        <p:par>
+                          <p:cTn id="9" fill="hold">
+                            <p:stCondLst>
+                              <p:cond delay="0"/>
+                            </p:stCondLst>
+                            <p:childTnLst>
+                              <p:par>
+                                <p:cTn id="10" presetID="10" presetClass="entr" presetSubtype="0" fill="hold" nodeType="clickEffect">
+                                  <p:stCondLst>
+                                    <p:cond delay="0"/>
+                                  </p:stCondLst>
+                                  <p:childTnLst>
+                                    <p:set>
+                                      <p:cBhvr>
+                                        <p:cTn id="11" dur="1" fill="hold">
+                                          <p:stCondLst>
+                                            <p:cond delay="0"/>
+                                          </p:stCondLst>
+                                        </p:cTn>
+                                        <p:tgtEl>
+                                          <p:spTgt spid="3">
+                                            <p:txEl>
+                                              <p:pRg st="1" end="1"/>
+                                            </p:txEl>
+                                          </p:spTgt>
+                                        </p:tgtEl>
+                                        <p:attrNameLst>
+                                          <p:attrName>style.visibility</p:attrName>
+                                        </p:attrNameLst>
+                                      </p:cBhvr>
+                                      <p:to>
+                                        <p:strVal val="visible"/>
+                                      </p:to>
+                                    </p:set>
+                                    <p:animEffect transition="in" filter="fade">
+                                      <p:cBhvr>
+                                        <p:cTn id="12" dur="500"/>
+                                        <p:tgtEl>
+                                          <p:spTgt spid="3">
+                                            <p:txEl>
+                                              <p:pRg st="1" end="1"/>
+                                            </p:txEl>
+                                          </p:spTgt>
+                                        </p:tgtEl>
+                                      </p:cBhvr>
+                                    </p:animEffect>
+                                  </p:childTnLst>
+                                </p:cTn>
+                              </p:par>
+                            </p:childTnLst>
+                          </p:cTn>
+                        </p:par>
+                      </p:childTnLst>
+                    </p:cTn>
+                  </p:par>
+                </p:childTnLst>
+              </p:cTn>
+              <p:prevCondLst>
+                <p:cond evt="onPrev" delay="0">
+                  <p:tgtEl>
+                    <p:sldTgt/>
+                  </p:tgtEl>
+                </p:cond>
+              </p:prevCondLst>
+              <p:nextCondLst>
+                <p:cond evt="onNext" delay="0">
+                  <p:tgtEl>
+                    <p:sldTgt/>
+                  </p:tgtEl>
+                </p:cond>
+              </p:nextCondLst>
+            </p:seq>
+          </p:childTnLst>
+        </p:cTn>
+      </p:par>
+    </p:tnLst>
+  </p:timing>
 </p:sld>
 </file>
 
@@ -3410,7 +3635,7 @@
           <a:p>
             <a:r>
               <a:rPr lang="en-US" dirty="0"/>
-              <a:t>Missing data</a:t>
+              <a:t>Solution for missing data</a:t>
             </a:r>
           </a:p>
         </p:txBody>
@@ -3431,10 +3656,90 @@
             <p:ph idx="1"/>
           </p:nvPr>
         </p:nvSpPr>
-        <p:spPr/>
+        <p:spPr>
+          <a:xfrm>
+            <a:off x="457200" y="1315989"/>
+            <a:ext cx="8229600" cy="5313411"/>
+          </a:xfrm>
+        </p:spPr>
         <p:txBody>
           <a:bodyPr/>
           <a:lstStyle/>
+          <a:p>
+            <a:r>
+              <a:rPr lang="en-US" dirty="0"/>
+              <a:t>1405 of 2410 IBU values missing</a:t>
+            </a:r>
+          </a:p>
+          <a:p>
+            <a:r>
+              <a:rPr lang="en-US" dirty="0"/>
+              <a:t>62 of 2410 ABV values missing</a:t>
+            </a:r>
+          </a:p>
+          <a:p>
+            <a:r>
+              <a:rPr lang="en-US" dirty="0"/>
+              <a:t>Use </a:t>
+            </a:r>
+            <a:r>
+              <a:rPr lang="en-US" dirty="0" err="1"/>
+              <a:t>kNN</a:t>
+            </a:r>
+            <a:r>
+              <a:rPr lang="en-US" dirty="0"/>
+              <a:t> to find ABV and IBU values for missing sample data</a:t>
+            </a:r>
+          </a:p>
+          <a:p>
+            <a:r>
+              <a:rPr lang="en-US" dirty="0"/>
+              <a:t>Using </a:t>
+            </a:r>
+            <a:r>
+              <a:rPr lang="en-US" dirty="0" err="1"/>
+              <a:t>kNN</a:t>
+            </a:r>
+            <a:r>
+              <a:rPr lang="en-US" dirty="0"/>
+              <a:t> did not change the median ABV and IBU data values</a:t>
+            </a:r>
+          </a:p>
+          <a:p>
+            <a:pPr marL="0" indent="0">
+              <a:buNone/>
+            </a:pPr>
+            <a:endParaRPr lang="en-US" dirty="0"/>
+          </a:p>
+          <a:p>
+            <a:pPr marL="0" indent="0" algn="ctr">
+              <a:buNone/>
+            </a:pPr>
+            <a:r>
+              <a:rPr lang="en-US" dirty="0">
+                <a:solidFill>
+                  <a:srgbClr val="FF0000"/>
+                </a:solidFill>
+              </a:rPr>
+              <a:t>*</a:t>
+            </a:r>
+            <a:r>
+              <a:rPr lang="en-US" b="1" dirty="0">
+                <a:solidFill>
+                  <a:srgbClr val="FF0000"/>
+                </a:solidFill>
+              </a:rPr>
+              <a:t>We feel that this was best solution outside of complete data set</a:t>
+            </a:r>
+            <a:r>
+              <a:rPr lang="en-US" dirty="0">
+                <a:solidFill>
+                  <a:srgbClr val="FF0000"/>
+                </a:solidFill>
+              </a:rPr>
+              <a:t>*</a:t>
+            </a:r>
+          </a:p>
           <a:p>
             <a:pPr marL="0" indent="0">
               <a:buNone/>
@@ -3453,6 +3758,341 @@
   <p:clrMapOvr>
     <a:masterClrMapping/>
   </p:clrMapOvr>
+  <p:timing>
+    <p:tnLst>
+      <p:par>
+        <p:cTn id="1" dur="indefinite" restart="never" nodeType="tmRoot">
+          <p:childTnLst>
+            <p:seq concurrent="1" nextAc="seek">
+              <p:cTn id="2" dur="indefinite" nodeType="mainSeq">
+                <p:childTnLst>
+                  <p:par>
+                    <p:cTn id="3" fill="hold">
+                      <p:stCondLst>
+                        <p:cond delay="indefinite"/>
+                      </p:stCondLst>
+                      <p:childTnLst>
+                        <p:par>
+                          <p:cTn id="4" fill="hold">
+                            <p:stCondLst>
+                              <p:cond delay="0"/>
+                            </p:stCondLst>
+                            <p:childTnLst>
+                              <p:par>
+                                <p:cTn id="5" presetID="10" presetClass="entr" presetSubtype="0" fill="hold" nodeType="clickEffect">
+                                  <p:stCondLst>
+                                    <p:cond delay="0"/>
+                                  </p:stCondLst>
+                                  <p:childTnLst>
+                                    <p:set>
+                                      <p:cBhvr>
+                                        <p:cTn id="6" dur="1" fill="hold">
+                                          <p:stCondLst>
+                                            <p:cond delay="0"/>
+                                          </p:stCondLst>
+                                        </p:cTn>
+                                        <p:tgtEl>
+                                          <p:spTgt spid="6">
+                                            <p:txEl>
+                                              <p:pRg st="0" end="0"/>
+                                            </p:txEl>
+                                          </p:spTgt>
+                                        </p:tgtEl>
+                                        <p:attrNameLst>
+                                          <p:attrName>style.visibility</p:attrName>
+                                        </p:attrNameLst>
+                                      </p:cBhvr>
+                                      <p:to>
+                                        <p:strVal val="visible"/>
+                                      </p:to>
+                                    </p:set>
+                                    <p:animEffect transition="in" filter="fade">
+                                      <p:cBhvr>
+                                        <p:cTn id="7" dur="500"/>
+                                        <p:tgtEl>
+                                          <p:spTgt spid="6">
+                                            <p:txEl>
+                                              <p:pRg st="0" end="0"/>
+                                            </p:txEl>
+                                          </p:spTgt>
+                                        </p:tgtEl>
+                                      </p:cBhvr>
+                                    </p:animEffect>
+                                  </p:childTnLst>
+                                </p:cTn>
+                              </p:par>
+                            </p:childTnLst>
+                          </p:cTn>
+                        </p:par>
+                      </p:childTnLst>
+                    </p:cTn>
+                  </p:par>
+                  <p:par>
+                    <p:cTn id="8" fill="hold">
+                      <p:stCondLst>
+                        <p:cond delay="indefinite"/>
+                      </p:stCondLst>
+                      <p:childTnLst>
+                        <p:par>
+                          <p:cTn id="9" fill="hold">
+                            <p:stCondLst>
+                              <p:cond delay="0"/>
+                            </p:stCondLst>
+                            <p:childTnLst>
+                              <p:par>
+                                <p:cTn id="10" presetID="10" presetClass="entr" presetSubtype="0" fill="hold" nodeType="clickEffect">
+                                  <p:stCondLst>
+                                    <p:cond delay="0"/>
+                                  </p:stCondLst>
+                                  <p:childTnLst>
+                                    <p:set>
+                                      <p:cBhvr>
+                                        <p:cTn id="11" dur="1" fill="hold">
+                                          <p:stCondLst>
+                                            <p:cond delay="0"/>
+                                          </p:stCondLst>
+                                        </p:cTn>
+                                        <p:tgtEl>
+                                          <p:spTgt spid="6">
+                                            <p:txEl>
+                                              <p:pRg st="1" end="1"/>
+                                            </p:txEl>
+                                          </p:spTgt>
+                                        </p:tgtEl>
+                                        <p:attrNameLst>
+                                          <p:attrName>style.visibility</p:attrName>
+                                        </p:attrNameLst>
+                                      </p:cBhvr>
+                                      <p:to>
+                                        <p:strVal val="visible"/>
+                                      </p:to>
+                                    </p:set>
+                                    <p:animEffect transition="in" filter="fade">
+                                      <p:cBhvr>
+                                        <p:cTn id="12" dur="500"/>
+                                        <p:tgtEl>
+                                          <p:spTgt spid="6">
+                                            <p:txEl>
+                                              <p:pRg st="1" end="1"/>
+                                            </p:txEl>
+                                          </p:spTgt>
+                                        </p:tgtEl>
+                                      </p:cBhvr>
+                                    </p:animEffect>
+                                  </p:childTnLst>
+                                </p:cTn>
+                              </p:par>
+                            </p:childTnLst>
+                          </p:cTn>
+                        </p:par>
+                      </p:childTnLst>
+                    </p:cTn>
+                  </p:par>
+                  <p:par>
+                    <p:cTn id="13" fill="hold">
+                      <p:stCondLst>
+                        <p:cond delay="indefinite"/>
+                      </p:stCondLst>
+                      <p:childTnLst>
+                        <p:par>
+                          <p:cTn id="14" fill="hold">
+                            <p:stCondLst>
+                              <p:cond delay="0"/>
+                            </p:stCondLst>
+                            <p:childTnLst>
+                              <p:par>
+                                <p:cTn id="15" presetID="10" presetClass="entr" presetSubtype="0" fill="hold" nodeType="clickEffect">
+                                  <p:stCondLst>
+                                    <p:cond delay="0"/>
+                                  </p:stCondLst>
+                                  <p:childTnLst>
+                                    <p:set>
+                                      <p:cBhvr>
+                                        <p:cTn id="16" dur="1" fill="hold">
+                                          <p:stCondLst>
+                                            <p:cond delay="0"/>
+                                          </p:stCondLst>
+                                        </p:cTn>
+                                        <p:tgtEl>
+                                          <p:spTgt spid="6">
+                                            <p:txEl>
+                                              <p:pRg st="2" end="2"/>
+                                            </p:txEl>
+                                          </p:spTgt>
+                                        </p:tgtEl>
+                                        <p:attrNameLst>
+                                          <p:attrName>style.visibility</p:attrName>
+                                        </p:attrNameLst>
+                                      </p:cBhvr>
+                                      <p:to>
+                                        <p:strVal val="visible"/>
+                                      </p:to>
+                                    </p:set>
+                                    <p:animEffect transition="in" filter="fade">
+                                      <p:cBhvr>
+                                        <p:cTn id="17" dur="500"/>
+                                        <p:tgtEl>
+                                          <p:spTgt spid="6">
+                                            <p:txEl>
+                                              <p:pRg st="2" end="2"/>
+                                            </p:txEl>
+                                          </p:spTgt>
+                                        </p:tgtEl>
+                                      </p:cBhvr>
+                                    </p:animEffect>
+                                  </p:childTnLst>
+                                </p:cTn>
+                              </p:par>
+                            </p:childTnLst>
+                          </p:cTn>
+                        </p:par>
+                      </p:childTnLst>
+                    </p:cTn>
+                  </p:par>
+                  <p:par>
+                    <p:cTn id="18" fill="hold">
+                      <p:stCondLst>
+                        <p:cond delay="indefinite"/>
+                      </p:stCondLst>
+                      <p:childTnLst>
+                        <p:par>
+                          <p:cTn id="19" fill="hold">
+                            <p:stCondLst>
+                              <p:cond delay="0"/>
+                            </p:stCondLst>
+                            <p:childTnLst>
+                              <p:par>
+                                <p:cTn id="20" presetID="10" presetClass="entr" presetSubtype="0" fill="hold" nodeType="clickEffect">
+                                  <p:stCondLst>
+                                    <p:cond delay="0"/>
+                                  </p:stCondLst>
+                                  <p:childTnLst>
+                                    <p:set>
+                                      <p:cBhvr>
+                                        <p:cTn id="21" dur="1" fill="hold">
+                                          <p:stCondLst>
+                                            <p:cond delay="0"/>
+                                          </p:stCondLst>
+                                        </p:cTn>
+                                        <p:tgtEl>
+                                          <p:spTgt spid="6">
+                                            <p:txEl>
+                                              <p:pRg st="3" end="3"/>
+                                            </p:txEl>
+                                          </p:spTgt>
+                                        </p:tgtEl>
+                                        <p:attrNameLst>
+                                          <p:attrName>style.visibility</p:attrName>
+                                        </p:attrNameLst>
+                                      </p:cBhvr>
+                                      <p:to>
+                                        <p:strVal val="visible"/>
+                                      </p:to>
+                                    </p:set>
+                                    <p:animEffect transition="in" filter="fade">
+                                      <p:cBhvr>
+                                        <p:cTn id="22" dur="500"/>
+                                        <p:tgtEl>
+                                          <p:spTgt spid="6">
+                                            <p:txEl>
+                                              <p:pRg st="3" end="3"/>
+                                            </p:txEl>
+                                          </p:spTgt>
+                                        </p:tgtEl>
+                                      </p:cBhvr>
+                                    </p:animEffect>
+                                  </p:childTnLst>
+                                </p:cTn>
+                              </p:par>
+                            </p:childTnLst>
+                          </p:cTn>
+                        </p:par>
+                      </p:childTnLst>
+                    </p:cTn>
+                  </p:par>
+                  <p:par>
+                    <p:cTn id="23" fill="hold">
+                      <p:stCondLst>
+                        <p:cond delay="indefinite"/>
+                      </p:stCondLst>
+                      <p:childTnLst>
+                        <p:par>
+                          <p:cTn id="24" fill="hold">
+                            <p:stCondLst>
+                              <p:cond delay="0"/>
+                            </p:stCondLst>
+                            <p:childTnLst>
+                              <p:par>
+                                <p:cTn id="25" presetID="10" presetClass="entr" presetSubtype="0" fill="hold" nodeType="clickEffect">
+                                  <p:stCondLst>
+                                    <p:cond delay="0"/>
+                                  </p:stCondLst>
+                                  <p:childTnLst>
+                                    <p:set>
+                                      <p:cBhvr>
+                                        <p:cTn id="26" dur="1" fill="hold">
+                                          <p:stCondLst>
+                                            <p:cond delay="0"/>
+                                          </p:stCondLst>
+                                        </p:cTn>
+                                        <p:tgtEl>
+                                          <p:spTgt spid="6">
+                                            <p:txEl>
+                                              <p:pRg st="5" end="5"/>
+                                            </p:txEl>
+                                          </p:spTgt>
+                                        </p:tgtEl>
+                                        <p:attrNameLst>
+                                          <p:attrName>style.visibility</p:attrName>
+                                        </p:attrNameLst>
+                                      </p:cBhvr>
+                                      <p:to>
+                                        <p:strVal val="visible"/>
+                                      </p:to>
+                                    </p:set>
+                                    <p:animEffect transition="in" filter="fade">
+                                      <p:cBhvr>
+                                        <p:cTn id="27" dur="500"/>
+                                        <p:tgtEl>
+                                          <p:spTgt spid="6">
+                                            <p:txEl>
+                                              <p:pRg st="5" end="5"/>
+                                            </p:txEl>
+                                          </p:spTgt>
+                                        </p:tgtEl>
+                                      </p:cBhvr>
+                                    </p:animEffect>
+                                  </p:childTnLst>
+                                </p:cTn>
+                              </p:par>
+                            </p:childTnLst>
+                          </p:cTn>
+                        </p:par>
+                      </p:childTnLst>
+                    </p:cTn>
+                  </p:par>
+                </p:childTnLst>
+              </p:cTn>
+              <p:prevCondLst>
+                <p:cond evt="onPrev" delay="0">
+                  <p:tgtEl>
+                    <p:sldTgt/>
+                  </p:tgtEl>
+                </p:cond>
+              </p:prevCondLst>
+              <p:nextCondLst>
+                <p:cond evt="onNext" delay="0">
+                  <p:tgtEl>
+                    <p:sldTgt/>
+                  </p:tgtEl>
+                </p:cond>
+              </p:nextCondLst>
+            </p:seq>
+          </p:childTnLst>
+        </p:cTn>
+      </p:par>
+    </p:tnLst>
+  </p:timing>
 </p:sld>
 </file>
 
@@ -5405,6 +6045,321 @@
           </a:ln>
         </p:spPr>
       </p:pic>
+      <p:grpSp>
+        <p:nvGrpSpPr>
+          <p:cNvPr id="12" name="Group 11">
+            <a:extLst>
+              <a:ext uri="{FF2B5EF4-FFF2-40B4-BE49-F238E27FC236}">
+                <a16:creationId xmlns:a16="http://schemas.microsoft.com/office/drawing/2014/main" id="{E46FA23A-372D-4292-881D-7E8B160A1FD9}"/>
+              </a:ext>
+            </a:extLst>
+          </p:cNvPr>
+          <p:cNvGrpSpPr/>
+          <p:nvPr/>
+        </p:nvGrpSpPr>
+        <p:grpSpPr>
+          <a:xfrm>
+            <a:off x="1036424" y="4803250"/>
+            <a:ext cx="1492083" cy="1059653"/>
+            <a:chOff x="1036424" y="4803250"/>
+            <a:chExt cx="1492083" cy="1059653"/>
+          </a:xfrm>
+        </p:grpSpPr>
+        <p:sp>
+          <p:nvSpPr>
+            <p:cNvPr id="4" name="Arrow: Down 3">
+              <a:extLst>
+                <a:ext uri="{FF2B5EF4-FFF2-40B4-BE49-F238E27FC236}">
+                  <a16:creationId xmlns:a16="http://schemas.microsoft.com/office/drawing/2014/main" id="{26E4C5E4-280F-4644-8E0A-D7DAD7412419}"/>
+                </a:ext>
+              </a:extLst>
+            </p:cNvPr>
+            <p:cNvSpPr/>
+            <p:nvPr/>
+          </p:nvSpPr>
+          <p:spPr>
+            <a:xfrm>
+              <a:off x="1714504" y="5214403"/>
+              <a:ext cx="234779" cy="648500"/>
+            </a:xfrm>
+            <a:prstGeom prst="downArrow">
+              <a:avLst/>
+            </a:prstGeom>
+          </p:spPr>
+          <p:style>
+            <a:lnRef idx="2">
+              <a:schemeClr val="accent1">
+                <a:shade val="50000"/>
+              </a:schemeClr>
+            </a:lnRef>
+            <a:fillRef idx="1">
+              <a:schemeClr val="accent1"/>
+            </a:fillRef>
+            <a:effectRef idx="0">
+              <a:schemeClr val="accent1"/>
+            </a:effectRef>
+            <a:fontRef idx="minor">
+              <a:schemeClr val="lt1"/>
+            </a:fontRef>
+          </p:style>
+          <p:txBody>
+            <a:bodyPr rtlCol="0" anchor="ctr"/>
+            <a:lstStyle/>
+            <a:p>
+              <a:pPr algn="ctr"/>
+              <a:endParaRPr lang="en-US" dirty="0"/>
+            </a:p>
+          </p:txBody>
+        </p:sp>
+        <p:sp>
+          <p:nvSpPr>
+            <p:cNvPr id="5" name="TextBox 4">
+              <a:extLst>
+                <a:ext uri="{FF2B5EF4-FFF2-40B4-BE49-F238E27FC236}">
+                  <a16:creationId xmlns:a16="http://schemas.microsoft.com/office/drawing/2014/main" id="{DC60B581-625F-49D3-B9F9-FA85157EA000}"/>
+                </a:ext>
+              </a:extLst>
+            </p:cNvPr>
+            <p:cNvSpPr txBox="1"/>
+            <p:nvPr/>
+          </p:nvSpPr>
+          <p:spPr>
+            <a:xfrm>
+              <a:off x="1036424" y="4803250"/>
+              <a:ext cx="1492083" cy="523220"/>
+            </a:xfrm>
+            <a:prstGeom prst="rect">
+              <a:avLst/>
+            </a:prstGeom>
+            <a:solidFill>
+              <a:schemeClr val="accent1"/>
+            </a:solidFill>
+          </p:spPr>
+          <p:txBody>
+            <a:bodyPr wrap="square" rtlCol="0">
+              <a:spAutoFit/>
+            </a:bodyPr>
+            <a:lstStyle/>
+            <a:p>
+              <a:pPr algn="ctr"/>
+              <a:r>
+                <a:rPr lang="en-US" sz="1400" b="1" dirty="0"/>
+                <a:t>Min ABV is 0.1%</a:t>
+              </a:r>
+            </a:p>
+          </p:txBody>
+        </p:sp>
+      </p:grpSp>
+      <p:grpSp>
+        <p:nvGrpSpPr>
+          <p:cNvPr id="11" name="Group 10">
+            <a:extLst>
+              <a:ext uri="{FF2B5EF4-FFF2-40B4-BE49-F238E27FC236}">
+                <a16:creationId xmlns:a16="http://schemas.microsoft.com/office/drawing/2014/main" id="{3D6296CB-10C5-4711-AD60-8F3F4F8D1C1D}"/>
+              </a:ext>
+            </a:extLst>
+          </p:cNvPr>
+          <p:cNvGrpSpPr/>
+          <p:nvPr/>
+        </p:nvGrpSpPr>
+        <p:grpSpPr>
+          <a:xfrm>
+            <a:off x="7194717" y="4803250"/>
+            <a:ext cx="1492083" cy="1059653"/>
+            <a:chOff x="7194717" y="4803250"/>
+            <a:chExt cx="1492083" cy="1059653"/>
+          </a:xfrm>
+        </p:grpSpPr>
+        <p:sp>
+          <p:nvSpPr>
+            <p:cNvPr id="6" name="Arrow: Down 5">
+              <a:extLst>
+                <a:ext uri="{FF2B5EF4-FFF2-40B4-BE49-F238E27FC236}">
+                  <a16:creationId xmlns:a16="http://schemas.microsoft.com/office/drawing/2014/main" id="{C438DADD-4529-4706-9FA9-0EBAAFC569DF}"/>
+                </a:ext>
+              </a:extLst>
+            </p:cNvPr>
+            <p:cNvSpPr/>
+            <p:nvPr/>
+          </p:nvSpPr>
+          <p:spPr>
+            <a:xfrm>
+              <a:off x="7872797" y="5214403"/>
+              <a:ext cx="234779" cy="648500"/>
+            </a:xfrm>
+            <a:prstGeom prst="downArrow">
+              <a:avLst/>
+            </a:prstGeom>
+          </p:spPr>
+          <p:style>
+            <a:lnRef idx="2">
+              <a:schemeClr val="accent1">
+                <a:shade val="50000"/>
+              </a:schemeClr>
+            </a:lnRef>
+            <a:fillRef idx="1">
+              <a:schemeClr val="accent1"/>
+            </a:fillRef>
+            <a:effectRef idx="0">
+              <a:schemeClr val="accent1"/>
+            </a:effectRef>
+            <a:fontRef idx="minor">
+              <a:schemeClr val="lt1"/>
+            </a:fontRef>
+          </p:style>
+          <p:txBody>
+            <a:bodyPr rtlCol="0" anchor="ctr"/>
+            <a:lstStyle/>
+            <a:p>
+              <a:pPr algn="ctr"/>
+              <a:endParaRPr lang="en-US" dirty="0"/>
+            </a:p>
+          </p:txBody>
+        </p:sp>
+        <p:sp>
+          <p:nvSpPr>
+            <p:cNvPr id="8" name="TextBox 7">
+              <a:extLst>
+                <a:ext uri="{FF2B5EF4-FFF2-40B4-BE49-F238E27FC236}">
+                  <a16:creationId xmlns:a16="http://schemas.microsoft.com/office/drawing/2014/main" id="{31D8ADCA-DA29-42F1-A84F-9E0B43721ECC}"/>
+                </a:ext>
+              </a:extLst>
+            </p:cNvPr>
+            <p:cNvSpPr txBox="1"/>
+            <p:nvPr/>
+          </p:nvSpPr>
+          <p:spPr>
+            <a:xfrm>
+              <a:off x="7194717" y="4803250"/>
+              <a:ext cx="1492083" cy="523220"/>
+            </a:xfrm>
+            <a:prstGeom prst="rect">
+              <a:avLst/>
+            </a:prstGeom>
+            <a:solidFill>
+              <a:schemeClr val="accent1"/>
+            </a:solidFill>
+          </p:spPr>
+          <p:txBody>
+            <a:bodyPr wrap="square" rtlCol="0">
+              <a:spAutoFit/>
+            </a:bodyPr>
+            <a:lstStyle/>
+            <a:p>
+              <a:pPr algn="ctr"/>
+              <a:r>
+                <a:rPr lang="en-US" sz="1400" b="1" dirty="0"/>
+                <a:t>Max ABV is 12.8%</a:t>
+              </a:r>
+            </a:p>
+          </p:txBody>
+        </p:sp>
+      </p:grpSp>
+      <p:grpSp>
+        <p:nvGrpSpPr>
+          <p:cNvPr id="3" name="Group 2">
+            <a:extLst>
+              <a:ext uri="{FF2B5EF4-FFF2-40B4-BE49-F238E27FC236}">
+                <a16:creationId xmlns:a16="http://schemas.microsoft.com/office/drawing/2014/main" id="{9698B516-A8D6-4CFC-B7E9-E3C37CA51756}"/>
+              </a:ext>
+            </a:extLst>
+          </p:cNvPr>
+          <p:cNvGrpSpPr/>
+          <p:nvPr/>
+        </p:nvGrpSpPr>
+        <p:grpSpPr>
+          <a:xfrm>
+            <a:off x="2193615" y="1885816"/>
+            <a:ext cx="1828087" cy="523220"/>
+            <a:chOff x="2193615" y="1885816"/>
+            <a:chExt cx="1828087" cy="523220"/>
+          </a:xfrm>
+        </p:grpSpPr>
+        <p:sp>
+          <p:nvSpPr>
+            <p:cNvPr id="9" name="Arrow: Right 8">
+              <a:extLst>
+                <a:ext uri="{FF2B5EF4-FFF2-40B4-BE49-F238E27FC236}">
+                  <a16:creationId xmlns:a16="http://schemas.microsoft.com/office/drawing/2014/main" id="{9A54A7FB-8120-462B-9DB4-F980D0D8A424}"/>
+                </a:ext>
+              </a:extLst>
+            </p:cNvPr>
+            <p:cNvSpPr/>
+            <p:nvPr/>
+          </p:nvSpPr>
+          <p:spPr>
+            <a:xfrm>
+              <a:off x="3685699" y="2054750"/>
+              <a:ext cx="336003" cy="185352"/>
+            </a:xfrm>
+            <a:prstGeom prst="rightArrow">
+              <a:avLst/>
+            </a:prstGeom>
+          </p:spPr>
+          <p:style>
+            <a:lnRef idx="2">
+              <a:schemeClr val="accent1">
+                <a:shade val="50000"/>
+              </a:schemeClr>
+            </a:lnRef>
+            <a:fillRef idx="1">
+              <a:schemeClr val="accent1"/>
+            </a:fillRef>
+            <a:effectRef idx="0">
+              <a:schemeClr val="accent1"/>
+            </a:effectRef>
+            <a:fontRef idx="minor">
+              <a:schemeClr val="lt1"/>
+            </a:fontRef>
+          </p:style>
+          <p:txBody>
+            <a:bodyPr rtlCol="0" anchor="ctr"/>
+            <a:lstStyle/>
+            <a:p>
+              <a:pPr algn="ctr"/>
+              <a:endParaRPr lang="en-US"/>
+            </a:p>
+          </p:txBody>
+        </p:sp>
+        <p:sp>
+          <p:nvSpPr>
+            <p:cNvPr id="10" name="TextBox 9">
+              <a:extLst>
+                <a:ext uri="{FF2B5EF4-FFF2-40B4-BE49-F238E27FC236}">
+                  <a16:creationId xmlns:a16="http://schemas.microsoft.com/office/drawing/2014/main" id="{378529AA-B890-489F-BC49-247DA62897C6}"/>
+                </a:ext>
+              </a:extLst>
+            </p:cNvPr>
+            <p:cNvSpPr txBox="1"/>
+            <p:nvPr/>
+          </p:nvSpPr>
+          <p:spPr>
+            <a:xfrm>
+              <a:off x="2193615" y="1885816"/>
+              <a:ext cx="1492083" cy="523220"/>
+            </a:xfrm>
+            <a:prstGeom prst="rect">
+              <a:avLst/>
+            </a:prstGeom>
+            <a:solidFill>
+              <a:schemeClr val="accent1"/>
+            </a:solidFill>
+          </p:spPr>
+          <p:txBody>
+            <a:bodyPr wrap="square" rtlCol="0">
+              <a:spAutoFit/>
+            </a:bodyPr>
+            <a:lstStyle/>
+            <a:p>
+              <a:pPr algn="ctr"/>
+              <a:r>
+                <a:rPr lang="en-US" sz="1400" b="1" dirty="0"/>
+                <a:t>Average ABV is 5.9%</a:t>
+              </a:r>
+            </a:p>
+          </p:txBody>
+        </p:sp>
+      </p:grpSp>
     </p:spTree>
     <p:extLst>
       <p:ext uri="{BB962C8B-B14F-4D97-AF65-F5344CB8AC3E}">
@@ -5415,6 +6370,225 @@
   <p:clrMapOvr>
     <a:masterClrMapping/>
   </p:clrMapOvr>
+  <p:timing>
+    <p:tnLst>
+      <p:par>
+        <p:cTn id="1" dur="indefinite" restart="never" nodeType="tmRoot">
+          <p:childTnLst>
+            <p:seq concurrent="1" nextAc="seek">
+              <p:cTn id="2" dur="indefinite" nodeType="mainSeq">
+                <p:childTnLst>
+                  <p:par>
+                    <p:cTn id="3" fill="hold">
+                      <p:stCondLst>
+                        <p:cond delay="indefinite"/>
+                      </p:stCondLst>
+                      <p:childTnLst>
+                        <p:par>
+                          <p:cTn id="4" fill="hold">
+                            <p:stCondLst>
+                              <p:cond delay="0"/>
+                            </p:stCondLst>
+                            <p:childTnLst>
+                              <p:par>
+                                <p:cTn id="5" presetID="2" presetClass="entr" presetSubtype="8" fill="hold" nodeType="clickEffect">
+                                  <p:stCondLst>
+                                    <p:cond delay="0"/>
+                                  </p:stCondLst>
+                                  <p:childTnLst>
+                                    <p:set>
+                                      <p:cBhvr>
+                                        <p:cTn id="6" dur="1" fill="hold">
+                                          <p:stCondLst>
+                                            <p:cond delay="0"/>
+                                          </p:stCondLst>
+                                        </p:cTn>
+                                        <p:tgtEl>
+                                          <p:spTgt spid="3"/>
+                                        </p:tgtEl>
+                                        <p:attrNameLst>
+                                          <p:attrName>style.visibility</p:attrName>
+                                        </p:attrNameLst>
+                                      </p:cBhvr>
+                                      <p:to>
+                                        <p:strVal val="visible"/>
+                                      </p:to>
+                                    </p:set>
+                                    <p:anim calcmode="lin" valueType="num">
+                                      <p:cBhvr additive="base">
+                                        <p:cTn id="7" dur="500" fill="hold"/>
+                                        <p:tgtEl>
+                                          <p:spTgt spid="3"/>
+                                        </p:tgtEl>
+                                        <p:attrNameLst>
+                                          <p:attrName>ppt_x</p:attrName>
+                                        </p:attrNameLst>
+                                      </p:cBhvr>
+                                      <p:tavLst>
+                                        <p:tav tm="0">
+                                          <p:val>
+                                            <p:strVal val="0-#ppt_w/2"/>
+                                          </p:val>
+                                        </p:tav>
+                                        <p:tav tm="100000">
+                                          <p:val>
+                                            <p:strVal val="#ppt_x"/>
+                                          </p:val>
+                                        </p:tav>
+                                      </p:tavLst>
+                                    </p:anim>
+                                    <p:anim calcmode="lin" valueType="num">
+                                      <p:cBhvr additive="base">
+                                        <p:cTn id="8" dur="500" fill="hold"/>
+                                        <p:tgtEl>
+                                          <p:spTgt spid="3"/>
+                                        </p:tgtEl>
+                                        <p:attrNameLst>
+                                          <p:attrName>ppt_y</p:attrName>
+                                        </p:attrNameLst>
+                                      </p:cBhvr>
+                                      <p:tavLst>
+                                        <p:tav tm="0">
+                                          <p:val>
+                                            <p:strVal val="#ppt_y"/>
+                                          </p:val>
+                                        </p:tav>
+                                        <p:tav tm="100000">
+                                          <p:val>
+                                            <p:strVal val="#ppt_y"/>
+                                          </p:val>
+                                        </p:tav>
+                                      </p:tavLst>
+                                    </p:anim>
+                                  </p:childTnLst>
+                                </p:cTn>
+                              </p:par>
+                            </p:childTnLst>
+                          </p:cTn>
+                        </p:par>
+                      </p:childTnLst>
+                    </p:cTn>
+                  </p:par>
+                  <p:par>
+                    <p:cTn id="9" fill="hold">
+                      <p:stCondLst>
+                        <p:cond delay="indefinite"/>
+                      </p:stCondLst>
+                      <p:childTnLst>
+                        <p:par>
+                          <p:cTn id="10" fill="hold">
+                            <p:stCondLst>
+                              <p:cond delay="0"/>
+                            </p:stCondLst>
+                            <p:childTnLst>
+                              <p:par>
+                                <p:cTn id="11" presetID="10" presetClass="entr" presetSubtype="0" fill="hold" nodeType="clickEffect">
+                                  <p:stCondLst>
+                                    <p:cond delay="0"/>
+                                  </p:stCondLst>
+                                  <p:childTnLst>
+                                    <p:set>
+                                      <p:cBhvr>
+                                        <p:cTn id="12" dur="1" fill="hold">
+                                          <p:stCondLst>
+                                            <p:cond delay="0"/>
+                                          </p:stCondLst>
+                                        </p:cTn>
+                                        <p:tgtEl>
+                                          <p:spTgt spid="12"/>
+                                        </p:tgtEl>
+                                        <p:attrNameLst>
+                                          <p:attrName>style.visibility</p:attrName>
+                                        </p:attrNameLst>
+                                      </p:cBhvr>
+                                      <p:to>
+                                        <p:strVal val="visible"/>
+                                      </p:to>
+                                    </p:set>
+                                    <p:animEffect transition="in" filter="fade">
+                                      <p:cBhvr>
+                                        <p:cTn id="13" dur="500"/>
+                                        <p:tgtEl>
+                                          <p:spTgt spid="12"/>
+                                        </p:tgtEl>
+                                      </p:cBhvr>
+                                    </p:animEffect>
+                                  </p:childTnLst>
+                                </p:cTn>
+                              </p:par>
+                            </p:childTnLst>
+                          </p:cTn>
+                        </p:par>
+                      </p:childTnLst>
+                    </p:cTn>
+                  </p:par>
+                  <p:par>
+                    <p:cTn id="14" fill="hold">
+                      <p:stCondLst>
+                        <p:cond delay="indefinite"/>
+                      </p:stCondLst>
+                      <p:childTnLst>
+                        <p:par>
+                          <p:cTn id="15" fill="hold">
+                            <p:stCondLst>
+                              <p:cond delay="0"/>
+                            </p:stCondLst>
+                            <p:childTnLst>
+                              <p:par>
+                                <p:cTn id="16" presetID="1" presetClass="entr" presetSubtype="0" fill="hold" nodeType="clickEffect">
+                                  <p:stCondLst>
+                                    <p:cond delay="0"/>
+                                  </p:stCondLst>
+                                  <p:childTnLst>
+                                    <p:set>
+                                      <p:cBhvr>
+                                        <p:cTn id="17" dur="1" fill="hold">
+                                          <p:stCondLst>
+                                            <p:cond delay="0"/>
+                                          </p:stCondLst>
+                                        </p:cTn>
+                                        <p:tgtEl>
+                                          <p:spTgt spid="11"/>
+                                        </p:tgtEl>
+                                        <p:attrNameLst>
+                                          <p:attrName>style.visibility</p:attrName>
+                                        </p:attrNameLst>
+                                      </p:cBhvr>
+                                      <p:to>
+                                        <p:strVal val="visible"/>
+                                      </p:to>
+                                    </p:set>
+                                  </p:childTnLst>
+                                </p:cTn>
+                              </p:par>
+                            </p:childTnLst>
+                          </p:cTn>
+                        </p:par>
+                      </p:childTnLst>
+                    </p:cTn>
+                  </p:par>
+                </p:childTnLst>
+              </p:cTn>
+              <p:prevCondLst>
+                <p:cond evt="onPrev" delay="0">
+                  <p:tgtEl>
+                    <p:sldTgt/>
+                  </p:tgtEl>
+                </p:cond>
+              </p:prevCondLst>
+              <p:nextCondLst>
+                <p:cond evt="onNext" delay="0">
+                  <p:tgtEl>
+                    <p:sldTgt/>
+                  </p:tgtEl>
+                </p:cond>
+              </p:nextCondLst>
+            </p:seq>
+          </p:childTnLst>
+        </p:cTn>
+      </p:par>
+    </p:tnLst>
+  </p:timing>
 </p:sld>
 </file>
 
@@ -5605,6 +6779,80 @@
           </p:txBody>
         </p:sp>
       </p:grpSp>
+      <p:sp>
+        <p:nvSpPr>
+          <p:cNvPr id="3" name="TextBox 2">
+            <a:extLst>
+              <a:ext uri="{FF2B5EF4-FFF2-40B4-BE49-F238E27FC236}">
+                <a16:creationId xmlns:a16="http://schemas.microsoft.com/office/drawing/2014/main" id="{5E415383-DCCF-41EF-9825-C0CEC6C28B4B}"/>
+              </a:ext>
+            </a:extLst>
+          </p:cNvPr>
+          <p:cNvSpPr txBox="1"/>
+          <p:nvPr/>
+        </p:nvSpPr>
+        <p:spPr>
+          <a:xfrm>
+            <a:off x="370704" y="3682311"/>
+            <a:ext cx="827902" cy="461665"/>
+          </a:xfrm>
+          <a:prstGeom prst="rect">
+            <a:avLst/>
+          </a:prstGeom>
+          <a:solidFill>
+            <a:schemeClr val="bg1"/>
+          </a:solidFill>
+        </p:spPr>
+        <p:txBody>
+          <a:bodyPr wrap="square" rtlCol="0">
+            <a:spAutoFit/>
+          </a:bodyPr>
+          <a:lstStyle/>
+          <a:p>
+            <a:r>
+              <a:rPr lang="en-US" sz="2400" dirty="0"/>
+              <a:t>ABV</a:t>
+            </a:r>
+          </a:p>
+        </p:txBody>
+      </p:sp>
+      <p:sp>
+        <p:nvSpPr>
+          <p:cNvPr id="8" name="TextBox 7">
+            <a:extLst>
+              <a:ext uri="{FF2B5EF4-FFF2-40B4-BE49-F238E27FC236}">
+                <a16:creationId xmlns:a16="http://schemas.microsoft.com/office/drawing/2014/main" id="{C033F64C-AD18-4E4A-BD97-A76873154B8E}"/>
+              </a:ext>
+            </a:extLst>
+          </p:cNvPr>
+          <p:cNvSpPr txBox="1"/>
+          <p:nvPr/>
+        </p:nvSpPr>
+        <p:spPr>
+          <a:xfrm>
+            <a:off x="4572000" y="6196565"/>
+            <a:ext cx="827902" cy="461665"/>
+          </a:xfrm>
+          <a:prstGeom prst="rect">
+            <a:avLst/>
+          </a:prstGeom>
+          <a:solidFill>
+            <a:schemeClr val="bg1"/>
+          </a:solidFill>
+        </p:spPr>
+        <p:txBody>
+          <a:bodyPr wrap="square" rtlCol="0">
+            <a:spAutoFit/>
+          </a:bodyPr>
+          <a:lstStyle/>
+          <a:p>
+            <a:r>
+              <a:rPr lang="en-US" sz="2400" dirty="0"/>
+              <a:t>IBU</a:t>
+            </a:r>
+          </a:p>
+        </p:txBody>
+      </p:sp>
     </p:spTree>
     <p:extLst>
       <p:ext uri="{BB962C8B-B14F-4D97-AF65-F5344CB8AC3E}">

</xml_diff>